<commit_message>
Alteracoes para proxima aula
</commit_message>
<xml_diff>
--- a/curso/modulo4capitulo1.pptx
+++ b/curso/modulo4capitulo1.pptx
@@ -13,6 +13,17 @@
     <p:sldId id="268" r:id="rId8"/>
     <p:sldId id="269" r:id="rId9"/>
     <p:sldId id="270" r:id="rId10"/>
+    <p:sldId id="271" r:id="rId11"/>
+    <p:sldId id="272" r:id="rId12"/>
+    <p:sldId id="273" r:id="rId13"/>
+    <p:sldId id="274" r:id="rId14"/>
+    <p:sldId id="275" r:id="rId15"/>
+    <p:sldId id="276" r:id="rId16"/>
+    <p:sldId id="277" r:id="rId17"/>
+    <p:sldId id="278" r:id="rId18"/>
+    <p:sldId id="279" r:id="rId19"/>
+    <p:sldId id="280" r:id="rId20"/>
+    <p:sldId id="281" r:id="rId21"/>
   </p:sldIdLst>
   <p:sldSz cx="9144000" cy="6858000" type="screen4x3"/>
   <p:notesSz cx="6858000" cy="9144000"/>
@@ -3738,6 +3749,1664 @@
 </p:sld>
 </file>
 
+<file path=ppt/slides/slide10.xml><?xml version="1.0" encoding="utf-8"?>
+<p:sld xmlns:a="http://schemas.openxmlformats.org/drawingml/2006/main" xmlns:r="http://schemas.openxmlformats.org/officeDocument/2006/relationships" xmlns:p="http://schemas.openxmlformats.org/presentationml/2006/main">
+  <p:cSld>
+    <p:spTree>
+      <p:nvGrpSpPr>
+        <p:cNvPr id="1" name=""/>
+        <p:cNvGrpSpPr/>
+        <p:nvPr/>
+      </p:nvGrpSpPr>
+      <p:grpSpPr/>
+      <p:sp>
+        <p:nvSpPr>
+          <p:cNvPr id="2" name="Title 1"/>
+          <p:cNvSpPr>
+            <a:spLocks noGrp="1"/>
+          </p:cNvSpPr>
+          <p:nvPr>
+            <p:ph type="title"/>
+          </p:nvPr>
+        </p:nvSpPr>
+        <p:spPr/>
+        <p:txBody>
+          <a:bodyPr/>
+          <a:p>
+            <a:r>
+              <a:rPr lang="x-none" altLang="pt-BR"/>
+              <a:t>Como a WWW funciona?</a:t>
+            </a:r>
+            <a:endParaRPr lang="x-none" altLang="pt-BR"/>
+          </a:p>
+        </p:txBody>
+      </p:sp>
+      <p:pic>
+        <p:nvPicPr>
+          <p:cNvPr id="4" name="Content Placeholder 3"/>
+          <p:cNvPicPr>
+            <a:picLocks noChangeAspect="1"/>
+          </p:cNvPicPr>
+          <p:nvPr>
+            <p:ph idx="1"/>
+          </p:nvPr>
+        </p:nvPicPr>
+        <p:blipFill>
+          <a:blip r:embed="rId1"/>
+          <a:stretch>
+            <a:fillRect/>
+          </a:stretch>
+        </p:blipFill>
+        <p:spPr>
+          <a:xfrm>
+            <a:off x="252095" y="2491105"/>
+            <a:ext cx="8635365" cy="3004820"/>
+          </a:xfrm>
+          <a:prstGeom prst="rect">
+            <a:avLst/>
+          </a:prstGeom>
+        </p:spPr>
+      </p:pic>
+    </p:spTree>
+  </p:cSld>
+  <p:clrMapOvr>
+    <a:masterClrMapping/>
+  </p:clrMapOvr>
+</p:sld>
+</file>
+
+<file path=ppt/slides/slide11.xml><?xml version="1.0" encoding="utf-8"?>
+<p:sld xmlns:a="http://schemas.openxmlformats.org/drawingml/2006/main" xmlns:r="http://schemas.openxmlformats.org/officeDocument/2006/relationships" xmlns:p="http://schemas.openxmlformats.org/presentationml/2006/main">
+  <p:cSld>
+    <p:spTree>
+      <p:nvGrpSpPr>
+        <p:cNvPr id="1" name=""/>
+        <p:cNvGrpSpPr/>
+        <p:nvPr/>
+      </p:nvGrpSpPr>
+      <p:grpSpPr/>
+      <p:sp>
+        <p:nvSpPr>
+          <p:cNvPr id="2" name="Title 1"/>
+          <p:cNvSpPr>
+            <a:spLocks noGrp="1"/>
+          </p:cNvSpPr>
+          <p:nvPr>
+            <p:ph type="title"/>
+          </p:nvPr>
+        </p:nvSpPr>
+        <p:spPr/>
+        <p:txBody>
+          <a:bodyPr/>
+          <a:p>
+            <a:r>
+              <a:rPr lang="x-none" altLang="pt-BR"/>
+              <a:t>Como a WWW funciona?</a:t>
+            </a:r>
+            <a:endParaRPr lang="x-none" altLang="pt-BR"/>
+          </a:p>
+        </p:txBody>
+      </p:sp>
+      <p:sp>
+        <p:nvSpPr>
+          <p:cNvPr id="3" name="Content Placeholder 2"/>
+          <p:cNvSpPr>
+            <a:spLocks noGrp="1"/>
+          </p:cNvSpPr>
+          <p:nvPr>
+            <p:ph idx="1"/>
+          </p:nvPr>
+        </p:nvSpPr>
+        <p:spPr/>
+        <p:txBody>
+          <a:bodyPr>
+            <a:normAutofit/>
+          </a:bodyPr>
+          <a:p>
+            <a:r>
+              <a:rPr lang="x-none" altLang="pt-BR">
+                <a:solidFill>
+                  <a:srgbClr val="92D050"/>
+                </a:solidFill>
+              </a:rPr>
+              <a:t>3) O navegador envia uma requisição HTTP para o servidor web</a:t>
+            </a:r>
+            <a:endParaRPr lang="x-none" altLang="pt-BR">
+              <a:solidFill>
+                <a:srgbClr val="92D050"/>
+              </a:solidFill>
+            </a:endParaRPr>
+          </a:p>
+          <a:p>
+            <a:pPr lvl="1"/>
+            <a:r>
+              <a:rPr lang="x-none" altLang="pt-BR" sz="1400">
+                <a:latin typeface="DejaVu Sans Mono" charset="0"/>
+              </a:rPr>
+              <a:t>GET / HTTP/1.1</a:t>
+            </a:r>
+            <a:endParaRPr lang="x-none" altLang="pt-BR" sz="1400">
+              <a:latin typeface="DejaVu Sans Mono" charset="0"/>
+            </a:endParaRPr>
+          </a:p>
+          <a:p>
+            <a:pPr lvl="1"/>
+            <a:r>
+              <a:rPr lang="x-none" altLang="pt-BR" sz="1400">
+                <a:latin typeface="DejaVu Sans Mono" charset="0"/>
+              </a:rPr>
+              <a:t>Host: facebook.com</a:t>
+            </a:r>
+            <a:endParaRPr lang="x-none" altLang="pt-BR" sz="1400">
+              <a:latin typeface="DejaVu Sans Mono" charset="0"/>
+            </a:endParaRPr>
+          </a:p>
+          <a:p>
+            <a:pPr lvl="1"/>
+            <a:r>
+              <a:rPr lang="x-none" altLang="pt-BR" sz="1400">
+                <a:latin typeface="DejaVu Sans Mono" charset="0"/>
+              </a:rPr>
+              <a:t>User-Agent: Mozilla/5.0 (X11; Linux x86_64; rv:2.0) Gecko/20110407 Firefox/4.0</a:t>
+            </a:r>
+            <a:endParaRPr lang="x-none" altLang="pt-BR" sz="1400">
+              <a:latin typeface="DejaVu Sans Mono" charset="0"/>
+            </a:endParaRPr>
+          </a:p>
+          <a:p>
+            <a:pPr lvl="1"/>
+            <a:r>
+              <a:rPr lang="x-none" altLang="pt-BR" sz="1400">
+                <a:latin typeface="DejaVu Sans Mono" charset="0"/>
+              </a:rPr>
+              <a:t>Accept: text/html,application/xhtml+xml,application/xml;q=0.9,*/*;q=0.8</a:t>
+            </a:r>
+            <a:endParaRPr lang="x-none" altLang="pt-BR" sz="1400">
+              <a:latin typeface="DejaVu Sans Mono" charset="0"/>
+            </a:endParaRPr>
+          </a:p>
+          <a:p>
+            <a:pPr lvl="1"/>
+            <a:r>
+              <a:rPr lang="x-none" altLang="pt-BR" sz="1400">
+                <a:latin typeface="DejaVu Sans Mono" charset="0"/>
+              </a:rPr>
+              <a:t>Accept-Language: pt-br,en-us;q=0.7,en;q=0.3</a:t>
+            </a:r>
+            <a:endParaRPr lang="x-none" altLang="pt-BR" sz="1400">
+              <a:latin typeface="DejaVu Sans Mono" charset="0"/>
+            </a:endParaRPr>
+          </a:p>
+          <a:p>
+            <a:pPr lvl="1"/>
+            <a:r>
+              <a:rPr lang="x-none" altLang="pt-BR" sz="1400">
+                <a:latin typeface="DejaVu Sans Mono" charset="0"/>
+              </a:rPr>
+              <a:t>Accept-Encoding: gzip, deflate</a:t>
+            </a:r>
+            <a:endParaRPr lang="x-none" altLang="pt-BR" sz="1400">
+              <a:latin typeface="DejaVu Sans Mono" charset="0"/>
+            </a:endParaRPr>
+          </a:p>
+          <a:p>
+            <a:pPr lvl="1"/>
+            <a:r>
+              <a:rPr lang="x-none" altLang="pt-BR" sz="1400">
+                <a:latin typeface="DejaVu Sans Mono" charset="0"/>
+              </a:rPr>
+              <a:t>Accept-Charset: ISO-8859-1,utf-8;q=0.7,*;q=0.7</a:t>
+            </a:r>
+            <a:endParaRPr lang="x-none" altLang="pt-BR" sz="1400">
+              <a:latin typeface="DejaVu Sans Mono" charset="0"/>
+            </a:endParaRPr>
+          </a:p>
+          <a:p>
+            <a:pPr lvl="1"/>
+            <a:r>
+              <a:rPr lang="x-none" altLang="pt-BR" sz="1400">
+                <a:latin typeface="DejaVu Sans Mono" charset="0"/>
+              </a:rPr>
+              <a:t>Keep-Alive: 115</a:t>
+            </a:r>
+            <a:endParaRPr lang="x-none" altLang="pt-BR" sz="1400">
+              <a:latin typeface="DejaVu Sans Mono" charset="0"/>
+            </a:endParaRPr>
+          </a:p>
+          <a:p>
+            <a:pPr lvl="1"/>
+            <a:endParaRPr lang="x-none" altLang="pt-BR"/>
+          </a:p>
+        </p:txBody>
+      </p:sp>
+      <p:pic>
+        <p:nvPicPr>
+          <p:cNvPr id="4" name="imagem 3"/>
+          <p:cNvPicPr>
+            <a:picLocks noChangeAspect="1"/>
+          </p:cNvPicPr>
+          <p:nvPr/>
+        </p:nvPicPr>
+        <p:blipFill>
+          <a:blip r:embed="rId1"/>
+          <a:stretch>
+            <a:fillRect/>
+          </a:stretch>
+        </p:blipFill>
+        <p:spPr>
+          <a:xfrm>
+            <a:off x="5864225" y="5306060"/>
+            <a:ext cx="2709545" cy="1179195"/>
+          </a:xfrm>
+          <a:prstGeom prst="rect">
+            <a:avLst/>
+          </a:prstGeom>
+        </p:spPr>
+      </p:pic>
+    </p:spTree>
+  </p:cSld>
+  <p:clrMapOvr>
+    <a:masterClrMapping/>
+  </p:clrMapOvr>
+</p:sld>
+</file>
+
+<file path=ppt/slides/slide12.xml><?xml version="1.0" encoding="utf-8"?>
+<p:sld xmlns:a="http://schemas.openxmlformats.org/drawingml/2006/main" xmlns:r="http://schemas.openxmlformats.org/officeDocument/2006/relationships" xmlns:p="http://schemas.openxmlformats.org/presentationml/2006/main">
+  <p:cSld>
+    <p:spTree>
+      <p:nvGrpSpPr>
+        <p:cNvPr id="1" name=""/>
+        <p:cNvGrpSpPr/>
+        <p:nvPr/>
+      </p:nvGrpSpPr>
+      <p:grpSpPr/>
+      <p:sp>
+        <p:nvSpPr>
+          <p:cNvPr id="2" name="Title 1"/>
+          <p:cNvSpPr>
+            <a:spLocks noGrp="1"/>
+          </p:cNvSpPr>
+          <p:nvPr>
+            <p:ph type="title"/>
+          </p:nvPr>
+        </p:nvSpPr>
+        <p:spPr/>
+        <p:txBody>
+          <a:bodyPr/>
+          <a:p>
+            <a:r>
+              <a:rPr lang="x-none" altLang="pt-BR"/>
+              <a:t>Como a WWW funciona?</a:t>
+            </a:r>
+            <a:endParaRPr lang="x-none" altLang="pt-BR"/>
+          </a:p>
+        </p:txBody>
+      </p:sp>
+      <p:sp>
+        <p:nvSpPr>
+          <p:cNvPr id="3" name="Content Placeholder 2"/>
+          <p:cNvSpPr>
+            <a:spLocks noGrp="1"/>
+          </p:cNvSpPr>
+          <p:nvPr>
+            <p:ph idx="1"/>
+          </p:nvPr>
+        </p:nvSpPr>
+        <p:spPr/>
+        <p:txBody>
+          <a:bodyPr>
+            <a:normAutofit/>
+          </a:bodyPr>
+          <a:p>
+            <a:r>
+              <a:rPr lang="x-none" altLang="pt-BR">
+                <a:solidFill>
+                  <a:srgbClr val="92D050"/>
+                </a:solidFill>
+              </a:rPr>
+              <a:t>4) O servidor responde com "301 Movido Permanentemente"</a:t>
+            </a:r>
+            <a:endParaRPr lang="x-none" altLang="pt-BR">
+              <a:solidFill>
+                <a:srgbClr val="92D050"/>
+              </a:solidFill>
+            </a:endParaRPr>
+          </a:p>
+          <a:p>
+            <a:pPr lvl="1"/>
+            <a:r>
+              <a:rPr lang="x-none" altLang="pt-BR" sz="1400">
+                <a:latin typeface="DejaVu Sans Mono" charset="0"/>
+              </a:rPr>
+              <a:t>HTTP/1.1 301 Moved Permanently</a:t>
+            </a:r>
+            <a:endParaRPr lang="x-none" altLang="pt-BR" sz="1400">
+              <a:latin typeface="DejaVu Sans Mono" charset="0"/>
+            </a:endParaRPr>
+          </a:p>
+          <a:p>
+            <a:pPr lvl="1"/>
+            <a:r>
+              <a:rPr lang="x-none" altLang="pt-BR" sz="1400">
+                <a:latin typeface="DejaVu Sans Mono" charset="0"/>
+              </a:rPr>
+              <a:t>Location: http://www.facebook.com/</a:t>
+            </a:r>
+            <a:endParaRPr lang="x-none" altLang="pt-BR" sz="1400">
+              <a:latin typeface="DejaVu Sans Mono" charset="0"/>
+            </a:endParaRPr>
+          </a:p>
+          <a:p>
+            <a:pPr lvl="1"/>
+            <a:r>
+              <a:rPr lang="x-none" altLang="pt-BR" sz="1400">
+                <a:latin typeface="DejaVu Sans Mono" charset="0"/>
+              </a:rPr>
+              <a:t>Content-Type: text/html; charset=utf-8</a:t>
+            </a:r>
+            <a:endParaRPr lang="x-none" altLang="pt-BR" sz="1400">
+              <a:latin typeface="DejaVu Sans Mono" charset="0"/>
+            </a:endParaRPr>
+          </a:p>
+          <a:p>
+            <a:pPr lvl="1"/>
+            <a:r>
+              <a:rPr lang="x-none" altLang="pt-BR" sz="1400">
+                <a:latin typeface="DejaVu Sans Mono" charset="0"/>
+              </a:rPr>
+              <a:t>X-FB-Server: 10.27.51.117</a:t>
+            </a:r>
+            <a:endParaRPr lang="x-none" altLang="pt-BR" sz="1400">
+              <a:latin typeface="DejaVu Sans Mono" charset="0"/>
+            </a:endParaRPr>
+          </a:p>
+          <a:p>
+            <a:pPr lvl="1"/>
+            <a:r>
+              <a:rPr lang="x-none" altLang="pt-BR" sz="1400">
+                <a:latin typeface="DejaVu Sans Mono" charset="0"/>
+              </a:rPr>
+              <a:t>X-Cnection: close</a:t>
+            </a:r>
+            <a:endParaRPr lang="x-none" altLang="pt-BR" sz="1400">
+              <a:latin typeface="DejaVu Sans Mono" charset="0"/>
+            </a:endParaRPr>
+          </a:p>
+          <a:p>
+            <a:pPr lvl="1"/>
+            <a:r>
+              <a:rPr lang="x-none" altLang="pt-BR" sz="1400">
+                <a:latin typeface="DejaVu Sans Mono" charset="0"/>
+              </a:rPr>
+              <a:t>Date: Sun, 01 May 2011 04:05:36 GMT</a:t>
+            </a:r>
+            <a:endParaRPr lang="x-none" altLang="pt-BR" sz="1400">
+              <a:latin typeface="DejaVu Sans Mono" charset="0"/>
+            </a:endParaRPr>
+          </a:p>
+          <a:p>
+            <a:pPr lvl="1"/>
+            <a:r>
+              <a:rPr lang="x-none" altLang="pt-BR" sz="1400">
+                <a:latin typeface="DejaVu Sans Mono" charset="0"/>
+              </a:rPr>
+              <a:t>Content-Length: 0</a:t>
+            </a:r>
+            <a:endParaRPr lang="x-none" altLang="pt-BR" sz="1400">
+              <a:latin typeface="DejaVu Sans Mono" charset="0"/>
+            </a:endParaRPr>
+          </a:p>
+        </p:txBody>
+      </p:sp>
+      <p:pic>
+        <p:nvPicPr>
+          <p:cNvPr id="4" name="imagem 3"/>
+          <p:cNvPicPr>
+            <a:picLocks noChangeAspect="1"/>
+          </p:cNvPicPr>
+          <p:nvPr/>
+        </p:nvPicPr>
+        <p:blipFill>
+          <a:blip r:embed="rId1"/>
+          <a:stretch>
+            <a:fillRect/>
+          </a:stretch>
+        </p:blipFill>
+        <p:spPr>
+          <a:xfrm>
+            <a:off x="5446395" y="5144770"/>
+            <a:ext cx="2964180" cy="1193165"/>
+          </a:xfrm>
+          <a:prstGeom prst="rect">
+            <a:avLst/>
+          </a:prstGeom>
+        </p:spPr>
+      </p:pic>
+    </p:spTree>
+  </p:cSld>
+  <p:clrMapOvr>
+    <a:masterClrMapping/>
+  </p:clrMapOvr>
+</p:sld>
+</file>
+
+<file path=ppt/slides/slide13.xml><?xml version="1.0" encoding="utf-8"?>
+<p:sld xmlns:a="http://schemas.openxmlformats.org/drawingml/2006/main" xmlns:r="http://schemas.openxmlformats.org/officeDocument/2006/relationships" xmlns:p="http://schemas.openxmlformats.org/presentationml/2006/main">
+  <p:cSld>
+    <p:spTree>
+      <p:nvGrpSpPr>
+        <p:cNvPr id="1" name=""/>
+        <p:cNvGrpSpPr/>
+        <p:nvPr/>
+      </p:nvGrpSpPr>
+      <p:grpSpPr/>
+      <p:sp>
+        <p:nvSpPr>
+          <p:cNvPr id="2" name="Title 1"/>
+          <p:cNvSpPr>
+            <a:spLocks noGrp="1"/>
+          </p:cNvSpPr>
+          <p:nvPr>
+            <p:ph type="title"/>
+          </p:nvPr>
+        </p:nvSpPr>
+        <p:spPr/>
+        <p:txBody>
+          <a:bodyPr/>
+          <a:p>
+            <a:r>
+              <a:rPr lang="x-none" altLang="pt-BR"/>
+              <a:t>Como a WWW funciona?</a:t>
+            </a:r>
+            <a:endParaRPr lang="x-none" altLang="pt-BR"/>
+          </a:p>
+        </p:txBody>
+      </p:sp>
+      <p:sp>
+        <p:nvSpPr>
+          <p:cNvPr id="3" name="Content Placeholder 2"/>
+          <p:cNvSpPr>
+            <a:spLocks noGrp="1"/>
+          </p:cNvSpPr>
+          <p:nvPr>
+            <p:ph idx="1"/>
+          </p:nvPr>
+        </p:nvSpPr>
+        <p:spPr/>
+        <p:txBody>
+          <a:bodyPr>
+            <a:normAutofit fontScale="60000"/>
+          </a:bodyPr>
+          <a:p>
+            <a:r>
+              <a:rPr lang="x-none" altLang="pt-BR">
+                <a:solidFill>
+                  <a:srgbClr val="92D050"/>
+                </a:solidFill>
+              </a:rPr>
+              <a:t>5) O navegador segue o redirecionamento e faz outra requisição HTTP</a:t>
+            </a:r>
+            <a:endParaRPr lang="x-none" altLang="pt-BR">
+              <a:solidFill>
+                <a:srgbClr val="92D050"/>
+              </a:solidFill>
+            </a:endParaRPr>
+          </a:p>
+          <a:p>
+            <a:pPr lvl="1"/>
+            <a:r>
+              <a:rPr lang="x-none" altLang="pt-BR">
+                <a:latin typeface="DejaVu Sans Mono" charset="0"/>
+              </a:rPr>
+              <a:t>GET / HTTP/1.1</a:t>
+            </a:r>
+            <a:endParaRPr lang="x-none" altLang="pt-BR">
+              <a:latin typeface="DejaVu Sans Mono" charset="0"/>
+            </a:endParaRPr>
+          </a:p>
+          <a:p>
+            <a:pPr lvl="1"/>
+            <a:r>
+              <a:rPr lang="x-none" altLang="pt-BR">
+                <a:latin typeface="DejaVu Sans Mono" charset="0"/>
+              </a:rPr>
+              <a:t>Host: www.facebook.com</a:t>
+            </a:r>
+            <a:endParaRPr lang="x-none" altLang="pt-BR">
+              <a:latin typeface="DejaVu Sans Mono" charset="0"/>
+            </a:endParaRPr>
+          </a:p>
+          <a:p>
+            <a:pPr lvl="1"/>
+            <a:r>
+              <a:rPr lang="x-none" altLang="pt-BR">
+                <a:latin typeface="DejaVu Sans Mono" charset="0"/>
+              </a:rPr>
+              <a:t>User-Agent: Mozilla/5.0 (X11; Linux x86_64; rv:2.0) Gecko/20110407 Firefox/4.0</a:t>
+            </a:r>
+            <a:endParaRPr lang="x-none" altLang="pt-BR">
+              <a:latin typeface="DejaVu Sans Mono" charset="0"/>
+            </a:endParaRPr>
+          </a:p>
+          <a:p>
+            <a:pPr lvl="1"/>
+            <a:r>
+              <a:rPr lang="x-none" altLang="pt-BR">
+                <a:latin typeface="DejaVu Sans Mono" charset="0"/>
+              </a:rPr>
+              <a:t>Accept: text/html,application/xhtml+xml,application/xml;q=0.9,*/*;q=0.8</a:t>
+            </a:r>
+            <a:endParaRPr lang="x-none" altLang="pt-BR">
+              <a:latin typeface="DejaVu Sans Mono" charset="0"/>
+            </a:endParaRPr>
+          </a:p>
+          <a:p>
+            <a:pPr lvl="1"/>
+            <a:r>
+              <a:rPr lang="x-none" altLang="pt-BR">
+                <a:latin typeface="DejaVu Sans Mono" charset="0"/>
+              </a:rPr>
+              <a:t>Accept-Language: pt-br,en-us;q=0.7,en;q=0.3</a:t>
+            </a:r>
+            <a:endParaRPr lang="x-none" altLang="pt-BR">
+              <a:latin typeface="DejaVu Sans Mono" charset="0"/>
+            </a:endParaRPr>
+          </a:p>
+          <a:p>
+            <a:pPr lvl="1"/>
+            <a:r>
+              <a:rPr lang="x-none" altLang="pt-BR">
+                <a:latin typeface="DejaVu Sans Mono" charset="0"/>
+              </a:rPr>
+              <a:t>Accept-Encoding: gzip, deflate</a:t>
+            </a:r>
+            <a:endParaRPr lang="x-none" altLang="pt-BR">
+              <a:latin typeface="DejaVu Sans Mono" charset="0"/>
+            </a:endParaRPr>
+          </a:p>
+          <a:p>
+            <a:pPr lvl="1"/>
+            <a:r>
+              <a:rPr lang="x-none" altLang="pt-BR">
+                <a:latin typeface="DejaVu Sans Mono" charset="0"/>
+              </a:rPr>
+              <a:t>Accept-Charset: ISO-8859-1,utf-8;q=0.7,*;q=0.7</a:t>
+            </a:r>
+            <a:endParaRPr lang="x-none" altLang="pt-BR">
+              <a:latin typeface="DejaVu Sans Mono" charset="0"/>
+            </a:endParaRPr>
+          </a:p>
+          <a:p>
+            <a:pPr lvl="1"/>
+            <a:r>
+              <a:rPr lang="x-none" altLang="pt-BR">
+                <a:latin typeface="DejaVu Sans Mono" charset="0"/>
+              </a:rPr>
+              <a:t>Keep-Alive: 115</a:t>
+            </a:r>
+            <a:endParaRPr lang="x-none" altLang="pt-BR">
+              <a:latin typeface="DejaVu Sans Mono" charset="0"/>
+            </a:endParaRPr>
+          </a:p>
+          <a:p>
+            <a:pPr lvl="1"/>
+            <a:r>
+              <a:rPr lang="x-none" altLang="pt-BR">
+                <a:latin typeface="DejaVu Sans Mono" charset="0"/>
+              </a:rPr>
+              <a:t>Connection: keep-alive</a:t>
+            </a:r>
+            <a:endParaRPr lang="x-none" altLang="pt-BR">
+              <a:latin typeface="DejaVu Sans Mono" charset="0"/>
+            </a:endParaRPr>
+          </a:p>
+        </p:txBody>
+      </p:sp>
+      <p:pic>
+        <p:nvPicPr>
+          <p:cNvPr id="4" name="imagem 3"/>
+          <p:cNvPicPr>
+            <a:picLocks noChangeAspect="1"/>
+          </p:cNvPicPr>
+          <p:nvPr/>
+        </p:nvPicPr>
+        <p:blipFill>
+          <a:blip r:embed="rId1"/>
+          <a:stretch>
+            <a:fillRect/>
+          </a:stretch>
+        </p:blipFill>
+        <p:spPr>
+          <a:xfrm>
+            <a:off x="5864225" y="5306060"/>
+            <a:ext cx="2709545" cy="1179195"/>
+          </a:xfrm>
+          <a:prstGeom prst="rect">
+            <a:avLst/>
+          </a:prstGeom>
+        </p:spPr>
+      </p:pic>
+    </p:spTree>
+  </p:cSld>
+  <p:clrMapOvr>
+    <a:masterClrMapping/>
+  </p:clrMapOvr>
+</p:sld>
+</file>
+
+<file path=ppt/slides/slide14.xml><?xml version="1.0" encoding="utf-8"?>
+<p:sld xmlns:a="http://schemas.openxmlformats.org/drawingml/2006/main" xmlns:r="http://schemas.openxmlformats.org/officeDocument/2006/relationships" xmlns:p="http://schemas.openxmlformats.org/presentationml/2006/main">
+  <p:cSld>
+    <p:spTree>
+      <p:nvGrpSpPr>
+        <p:cNvPr id="1" name=""/>
+        <p:cNvGrpSpPr/>
+        <p:nvPr/>
+      </p:nvGrpSpPr>
+      <p:grpSpPr/>
+      <p:sp>
+        <p:nvSpPr>
+          <p:cNvPr id="2" name="Title 1"/>
+          <p:cNvSpPr>
+            <a:spLocks noGrp="1"/>
+          </p:cNvSpPr>
+          <p:nvPr>
+            <p:ph type="title"/>
+          </p:nvPr>
+        </p:nvSpPr>
+        <p:spPr/>
+        <p:txBody>
+          <a:bodyPr/>
+          <a:p>
+            <a:r>
+              <a:rPr lang="x-none" altLang="pt-BR"/>
+              <a:t>Como a WWW funciona?</a:t>
+            </a:r>
+            <a:endParaRPr lang="x-none" altLang="pt-BR"/>
+          </a:p>
+        </p:txBody>
+      </p:sp>
+      <p:sp>
+        <p:nvSpPr>
+          <p:cNvPr id="3" name="Content Placeholder 2"/>
+          <p:cNvSpPr>
+            <a:spLocks noGrp="1"/>
+          </p:cNvSpPr>
+          <p:nvPr>
+            <p:ph idx="1"/>
+          </p:nvPr>
+        </p:nvSpPr>
+        <p:spPr/>
+        <p:txBody>
+          <a:bodyPr>
+            <a:normAutofit fontScale="70000"/>
+          </a:bodyPr>
+          <a:p>
+            <a:r>
+              <a:rPr lang="x-none" altLang="pt-BR">
+                <a:solidFill>
+                  <a:srgbClr val="92D050"/>
+                </a:solidFill>
+              </a:rPr>
+              <a:t>6) O servidor web trata a requisição</a:t>
+            </a:r>
+            <a:endParaRPr lang="x-none" altLang="pt-BR">
+              <a:solidFill>
+                <a:srgbClr val="92D050"/>
+              </a:solidFill>
+            </a:endParaRPr>
+          </a:p>
+          <a:p>
+            <a:pPr lvl="1"/>
+            <a:r>
+              <a:rPr lang="x-none" altLang="pt-BR"/>
+              <a:t>Exemplos de servidor web:</a:t>
+            </a:r>
+            <a:endParaRPr lang="x-none" altLang="pt-BR"/>
+          </a:p>
+          <a:p>
+            <a:pPr lvl="2"/>
+            <a:r>
+              <a:rPr lang="x-none" altLang="pt-BR"/>
+              <a:t>Microsoft IIS</a:t>
+            </a:r>
+            <a:endParaRPr lang="x-none" altLang="pt-BR"/>
+          </a:p>
+          <a:p>
+            <a:pPr lvl="2"/>
+            <a:r>
+              <a:rPr lang="x-none" altLang="pt-BR"/>
+              <a:t>Microsoft Cassini</a:t>
+            </a:r>
+            <a:endParaRPr lang="x-none" altLang="pt-BR"/>
+          </a:p>
+          <a:p>
+            <a:pPr lvl="2"/>
+            <a:r>
+              <a:rPr lang="x-none" altLang="pt-BR"/>
+              <a:t>Apache</a:t>
+            </a:r>
+            <a:endParaRPr lang="x-none" altLang="pt-BR"/>
+          </a:p>
+          <a:p>
+            <a:pPr lvl="2"/>
+            <a:r>
+              <a:rPr lang="x-none" altLang="pt-BR"/>
+              <a:t>NginX</a:t>
+            </a:r>
+            <a:endParaRPr lang="x-none" altLang="pt-BR"/>
+          </a:p>
+          <a:p>
+            <a:pPr lvl="2"/>
+            <a:r>
+              <a:rPr lang="x-none" altLang="pt-BR"/>
+              <a:t>Mono XSP</a:t>
+            </a:r>
+            <a:endParaRPr lang="x-none" altLang="pt-BR"/>
+          </a:p>
+          <a:p>
+            <a:pPr lvl="1"/>
+            <a:r>
+              <a:rPr lang="x-none" altLang="pt-BR"/>
+              <a:t>O servidor web decide qual </a:t>
+            </a:r>
+            <a:r>
+              <a:rPr lang="x-none" altLang="pt-BR">
+                <a:solidFill>
+                  <a:srgbClr val="92D050"/>
+                </a:solidFill>
+              </a:rPr>
+              <a:t>request handler</a:t>
+            </a:r>
+            <a:r>
+              <a:rPr lang="x-none" altLang="pt-BR"/>
+              <a:t> (manipulador de requisição) usar. Exemplos de request handlers:</a:t>
+            </a:r>
+            <a:endParaRPr lang="x-none" altLang="pt-BR"/>
+          </a:p>
+          <a:p>
+            <a:pPr lvl="2"/>
+            <a:r>
+              <a:rPr lang="x-none" altLang="pt-BR">
+                <a:solidFill>
+                  <a:srgbClr val="00B0F0"/>
+                </a:solidFill>
+              </a:rPr>
+              <a:t>HTTP puro (ou estático)</a:t>
+            </a:r>
+            <a:endParaRPr lang="x-none" altLang="pt-BR">
+              <a:solidFill>
+                <a:srgbClr val="00B0F0"/>
+              </a:solidFill>
+            </a:endParaRPr>
+          </a:p>
+          <a:p>
+            <a:pPr lvl="2"/>
+            <a:r>
+              <a:rPr lang="x-none" altLang="pt-BR">
+                <a:solidFill>
+                  <a:srgbClr val="00B0F0"/>
+                </a:solidFill>
+              </a:rPr>
+              <a:t>ASP.NET</a:t>
+            </a:r>
+            <a:endParaRPr lang="x-none" altLang="pt-BR">
+              <a:solidFill>
+                <a:srgbClr val="00B0F0"/>
+              </a:solidFill>
+            </a:endParaRPr>
+          </a:p>
+          <a:p>
+            <a:pPr lvl="2"/>
+            <a:r>
+              <a:rPr lang="x-none" altLang="pt-BR"/>
+              <a:t>PHP</a:t>
+            </a:r>
+            <a:endParaRPr lang="x-none" altLang="pt-BR"/>
+          </a:p>
+          <a:p>
+            <a:pPr lvl="2"/>
+            <a:r>
+              <a:rPr lang="x-none" altLang="pt-BR"/>
+              <a:t>Ruby On Rails</a:t>
+            </a:r>
+            <a:endParaRPr lang="x-none" altLang="pt-BR"/>
+          </a:p>
+          <a:p>
+            <a:pPr lvl="2"/>
+            <a:r>
+              <a:rPr lang="x-none" altLang="pt-BR"/>
+              <a:t>Django</a:t>
+            </a:r>
+            <a:endParaRPr lang="x-none" altLang="pt-BR"/>
+          </a:p>
+        </p:txBody>
+      </p:sp>
+      <p:pic>
+        <p:nvPicPr>
+          <p:cNvPr id="4" name="imagem 3"/>
+          <p:cNvPicPr>
+            <a:picLocks noChangeAspect="1"/>
+          </p:cNvPicPr>
+          <p:nvPr/>
+        </p:nvPicPr>
+        <p:blipFill>
+          <a:blip r:embed="rId1"/>
+          <a:stretch>
+            <a:fillRect/>
+          </a:stretch>
+        </p:blipFill>
+        <p:spPr>
+          <a:xfrm>
+            <a:off x="6909435" y="4921885"/>
+            <a:ext cx="1428750" cy="1186180"/>
+          </a:xfrm>
+          <a:prstGeom prst="rect">
+            <a:avLst/>
+          </a:prstGeom>
+        </p:spPr>
+      </p:pic>
+    </p:spTree>
+  </p:cSld>
+  <p:clrMapOvr>
+    <a:masterClrMapping/>
+  </p:clrMapOvr>
+</p:sld>
+</file>
+
+<file path=ppt/slides/slide15.xml><?xml version="1.0" encoding="utf-8"?>
+<p:sld xmlns:a="http://schemas.openxmlformats.org/drawingml/2006/main" xmlns:r="http://schemas.openxmlformats.org/officeDocument/2006/relationships" xmlns:p="http://schemas.openxmlformats.org/presentationml/2006/main">
+  <p:cSld>
+    <p:spTree>
+      <p:nvGrpSpPr>
+        <p:cNvPr id="1" name=""/>
+        <p:cNvGrpSpPr/>
+        <p:nvPr/>
+      </p:nvGrpSpPr>
+      <p:grpSpPr/>
+      <p:sp>
+        <p:nvSpPr>
+          <p:cNvPr id="2" name="Title 1"/>
+          <p:cNvSpPr>
+            <a:spLocks noGrp="1"/>
+          </p:cNvSpPr>
+          <p:nvPr>
+            <p:ph type="title"/>
+          </p:nvPr>
+        </p:nvSpPr>
+        <p:spPr/>
+        <p:txBody>
+          <a:bodyPr/>
+          <a:p>
+            <a:r>
+              <a:rPr lang="x-none" altLang="pt-BR"/>
+              <a:t>Como a WWW funciona?</a:t>
+            </a:r>
+            <a:endParaRPr lang="x-none" altLang="pt-BR"/>
+          </a:p>
+        </p:txBody>
+      </p:sp>
+      <p:sp>
+        <p:nvSpPr>
+          <p:cNvPr id="3" name="Content Placeholder 2"/>
+          <p:cNvSpPr>
+            <a:spLocks noGrp="1"/>
+          </p:cNvSpPr>
+          <p:nvPr>
+            <p:ph idx="1"/>
+          </p:nvPr>
+        </p:nvSpPr>
+        <p:spPr/>
+        <p:txBody>
+          <a:bodyPr>
+            <a:normAutofit fontScale="40000"/>
+          </a:bodyPr>
+          <a:p>
+            <a:r>
+              <a:rPr lang="x-none" altLang="pt-BR" sz="4800">
+                <a:solidFill>
+                  <a:srgbClr val="92D050"/>
+                </a:solidFill>
+              </a:rPr>
+              <a:t>7) O servidor web envia uma resposta HTTP</a:t>
+            </a:r>
+            <a:endParaRPr lang="x-none" altLang="pt-BR" sz="4800">
+              <a:solidFill>
+                <a:srgbClr val="92D050"/>
+              </a:solidFill>
+            </a:endParaRPr>
+          </a:p>
+          <a:p>
+            <a:pPr lvl="1"/>
+            <a:r>
+              <a:rPr lang="x-none" altLang="pt-BR" sz="4400"/>
+              <a:t>Cabeçalho:</a:t>
+            </a:r>
+            <a:endParaRPr lang="x-none" altLang="pt-BR" sz="4400"/>
+          </a:p>
+          <a:p>
+            <a:pPr lvl="2"/>
+            <a:r>
+              <a:rPr lang="x-none" altLang="pt-BR">
+                <a:latin typeface="DejaVu Sans Mono" charset="0"/>
+              </a:rPr>
+              <a:t>HTTP/1.1 200 OK</a:t>
+            </a:r>
+            <a:endParaRPr lang="x-none" altLang="pt-BR">
+              <a:latin typeface="DejaVu Sans Mono" charset="0"/>
+            </a:endParaRPr>
+          </a:p>
+          <a:p>
+            <a:pPr lvl="2"/>
+            <a:r>
+              <a:rPr lang="x-none" altLang="pt-BR">
+                <a:latin typeface="DejaVu Sans Mono" charset="0"/>
+              </a:rPr>
+              <a:t>Cache-Control: private, no-store, no-cache, must-revalidate, post-check=0, pre-check=0</a:t>
+            </a:r>
+            <a:endParaRPr lang="x-none" altLang="pt-BR">
+              <a:latin typeface="DejaVu Sans Mono" charset="0"/>
+            </a:endParaRPr>
+          </a:p>
+          <a:p>
+            <a:pPr lvl="2"/>
+            <a:r>
+              <a:rPr lang="x-none" altLang="pt-BR">
+                <a:latin typeface="DejaVu Sans Mono" charset="0"/>
+              </a:rPr>
+              <a:t>Expires: Sat, 01 Jan 2000 00:00:00 GMT</a:t>
+            </a:r>
+            <a:endParaRPr lang="x-none" altLang="pt-BR">
+              <a:latin typeface="DejaVu Sans Mono" charset="0"/>
+            </a:endParaRPr>
+          </a:p>
+          <a:p>
+            <a:pPr lvl="2"/>
+            <a:r>
+              <a:rPr lang="x-none" altLang="pt-BR">
+                <a:latin typeface="DejaVu Sans Mono" charset="0"/>
+              </a:rPr>
+              <a:t>P3P: CP="DSP LAW"</a:t>
+            </a:r>
+            <a:endParaRPr lang="x-none" altLang="pt-BR">
+              <a:latin typeface="DejaVu Sans Mono" charset="0"/>
+            </a:endParaRPr>
+          </a:p>
+          <a:p>
+            <a:pPr lvl="2"/>
+            <a:r>
+              <a:rPr lang="x-none" altLang="pt-BR">
+                <a:latin typeface="DejaVu Sans Mono" charset="0"/>
+              </a:rPr>
+              <a:t>Pragma: no-cache</a:t>
+            </a:r>
+            <a:endParaRPr lang="x-none" altLang="pt-BR">
+              <a:latin typeface="DejaVu Sans Mono" charset="0"/>
+            </a:endParaRPr>
+          </a:p>
+          <a:p>
+            <a:pPr lvl="2"/>
+            <a:r>
+              <a:rPr lang="x-none" altLang="pt-BR">
+                <a:latin typeface="DejaVu Sans Mono" charset="0"/>
+              </a:rPr>
+              <a:t>Content-Encoding: gzip</a:t>
+            </a:r>
+            <a:endParaRPr lang="x-none" altLang="pt-BR">
+              <a:latin typeface="DejaVu Sans Mono" charset="0"/>
+            </a:endParaRPr>
+          </a:p>
+          <a:p>
+            <a:pPr lvl="2"/>
+            <a:r>
+              <a:rPr lang="x-none" altLang="pt-BR">
+                <a:latin typeface="DejaVu Sans Mono" charset="0"/>
+              </a:rPr>
+              <a:t>Content-Type: text/html; charset=utf-8</a:t>
+            </a:r>
+            <a:endParaRPr lang="x-none" altLang="pt-BR">
+              <a:latin typeface="DejaVu Sans Mono" charset="0"/>
+            </a:endParaRPr>
+          </a:p>
+          <a:p>
+            <a:pPr lvl="2"/>
+            <a:r>
+              <a:rPr lang="x-none" altLang="pt-BR">
+                <a:latin typeface="DejaVu Sans Mono" charset="0"/>
+              </a:rPr>
+              <a:t>X-Cnection: close</a:t>
+            </a:r>
+            <a:endParaRPr lang="x-none" altLang="pt-BR">
+              <a:latin typeface="DejaVu Sans Mono" charset="0"/>
+            </a:endParaRPr>
+          </a:p>
+          <a:p>
+            <a:pPr lvl="2"/>
+            <a:r>
+              <a:rPr lang="x-none" altLang="pt-BR">
+                <a:latin typeface="DejaVu Sans Mono" charset="0"/>
+              </a:rPr>
+              <a:t>Transfer-Encoding: chunked</a:t>
+            </a:r>
+            <a:endParaRPr lang="x-none" altLang="pt-BR">
+              <a:latin typeface="DejaVu Sans Mono" charset="0"/>
+            </a:endParaRPr>
+          </a:p>
+          <a:p>
+            <a:pPr lvl="2"/>
+            <a:r>
+              <a:rPr lang="x-none" altLang="pt-BR">
+                <a:latin typeface="DejaVu Sans Mono" charset="0"/>
+              </a:rPr>
+              <a:t>Date: Fri, 12 Feb 2010 09:05:55 GMT</a:t>
+            </a:r>
+            <a:endParaRPr lang="x-none" altLang="pt-BR">
+              <a:latin typeface="DejaVu Sans Mono" charset="0"/>
+            </a:endParaRPr>
+          </a:p>
+          <a:p>
+            <a:pPr lvl="1"/>
+            <a:r>
+              <a:rPr lang="x-none" altLang="pt-BR" sz="4400"/>
+              <a:t>Conteúdo HTML:</a:t>
+            </a:r>
+            <a:endParaRPr lang="x-none" altLang="pt-BR" sz="4400"/>
+          </a:p>
+          <a:p>
+            <a:pPr lvl="2"/>
+            <a:r>
+              <a:rPr lang="x-none" altLang="pt-BR">
+                <a:latin typeface="DejaVu Sans Mono" charset="0"/>
+              </a:rPr>
+              <a:t>&lt;!DOCTYPE html PUBLIC "-//W3C//DTD XHTML 1.0 Strict//EN"   "http://www.w3.org/TR/xhtml1/DTD/xhtml1-strict.dtd"&gt;</a:t>
+            </a:r>
+            <a:endParaRPr lang="x-none" altLang="pt-BR">
+              <a:latin typeface="DejaVu Sans Mono" charset="0"/>
+            </a:endParaRPr>
+          </a:p>
+          <a:p>
+            <a:pPr lvl="2"/>
+            <a:r>
+              <a:rPr lang="x-none" altLang="pt-BR">
+                <a:latin typeface="DejaVu Sans Mono" charset="0"/>
+              </a:rPr>
+              <a:t>&lt;html xmlns="http://www.w3.org/1999/xhtml" xml:lang="en" lang="en" id="facebook" class=" no_js"&gt;</a:t>
+            </a:r>
+            <a:endParaRPr lang="x-none" altLang="pt-BR">
+              <a:latin typeface="DejaVu Sans Mono" charset="0"/>
+            </a:endParaRPr>
+          </a:p>
+          <a:p>
+            <a:pPr lvl="2"/>
+            <a:r>
+              <a:rPr lang="x-none" altLang="pt-BR">
+                <a:latin typeface="DejaVu Sans Mono" charset="0"/>
+              </a:rPr>
+              <a:t>&lt;head&gt;</a:t>
+            </a:r>
+            <a:endParaRPr lang="x-none" altLang="pt-BR">
+              <a:latin typeface="DejaVu Sans Mono" charset="0"/>
+            </a:endParaRPr>
+          </a:p>
+          <a:p>
+            <a:pPr lvl="2"/>
+            <a:r>
+              <a:rPr lang="x-none" altLang="pt-BR">
+                <a:latin typeface="DejaVu Sans Mono" charset="0"/>
+              </a:rPr>
+              <a:t>&lt;meta http-equiv="Content-type" content="text/html; charset=utf-8" /&gt;</a:t>
+            </a:r>
+            <a:endParaRPr lang="x-none" altLang="pt-BR">
+              <a:latin typeface="DejaVu Sans Mono" charset="0"/>
+            </a:endParaRPr>
+          </a:p>
+          <a:p>
+            <a:pPr lvl="2"/>
+            <a:r>
+              <a:rPr lang="x-none" altLang="pt-BR">
+                <a:latin typeface="DejaVu Sans Mono" charset="0"/>
+              </a:rPr>
+              <a:t>&lt;meta http-equiv="Content-language" content="en" /&gt;</a:t>
+            </a:r>
+            <a:endParaRPr lang="x-none" altLang="pt-BR">
+              <a:latin typeface="DejaVu Sans Mono" charset="0"/>
+            </a:endParaRPr>
+          </a:p>
+        </p:txBody>
+      </p:sp>
+      <p:pic>
+        <p:nvPicPr>
+          <p:cNvPr id="4" name="imagem 3"/>
+          <p:cNvPicPr>
+            <a:picLocks noChangeAspect="1"/>
+          </p:cNvPicPr>
+          <p:nvPr/>
+        </p:nvPicPr>
+        <p:blipFill>
+          <a:blip r:embed="rId1"/>
+          <a:stretch>
+            <a:fillRect/>
+          </a:stretch>
+        </p:blipFill>
+        <p:spPr>
+          <a:xfrm>
+            <a:off x="6732270" y="5732780"/>
+            <a:ext cx="2038350" cy="820420"/>
+          </a:xfrm>
+          <a:prstGeom prst="rect">
+            <a:avLst/>
+          </a:prstGeom>
+        </p:spPr>
+      </p:pic>
+    </p:spTree>
+  </p:cSld>
+  <p:clrMapOvr>
+    <a:masterClrMapping/>
+  </p:clrMapOvr>
+</p:sld>
+</file>
+
+<file path=ppt/slides/slide16.xml><?xml version="1.0" encoding="utf-8"?>
+<p:sld xmlns:a="http://schemas.openxmlformats.org/drawingml/2006/main" xmlns:r="http://schemas.openxmlformats.org/officeDocument/2006/relationships" xmlns:p="http://schemas.openxmlformats.org/presentationml/2006/main">
+  <p:cSld>
+    <p:spTree>
+      <p:nvGrpSpPr>
+        <p:cNvPr id="1" name=""/>
+        <p:cNvGrpSpPr/>
+        <p:nvPr/>
+      </p:nvGrpSpPr>
+      <p:grpSpPr/>
+      <p:sp>
+        <p:nvSpPr>
+          <p:cNvPr id="2" name="Title 1"/>
+          <p:cNvSpPr>
+            <a:spLocks noGrp="1"/>
+          </p:cNvSpPr>
+          <p:nvPr>
+            <p:ph type="title"/>
+          </p:nvPr>
+        </p:nvSpPr>
+        <p:spPr/>
+        <p:txBody>
+          <a:bodyPr/>
+          <a:p>
+            <a:r>
+              <a:rPr lang="x-none" altLang="pt-BR"/>
+              <a:t>Como a WWW funciona?</a:t>
+            </a:r>
+            <a:endParaRPr lang="x-none" altLang="pt-BR"/>
+          </a:p>
+        </p:txBody>
+      </p:sp>
+      <p:sp>
+        <p:nvSpPr>
+          <p:cNvPr id="3" name="Content Placeholder 2"/>
+          <p:cNvSpPr>
+            <a:spLocks noGrp="1"/>
+          </p:cNvSpPr>
+          <p:nvPr>
+            <p:ph idx="1"/>
+          </p:nvPr>
+        </p:nvSpPr>
+        <p:spPr/>
+        <p:txBody>
+          <a:bodyPr/>
+          <a:p>
+            <a:r>
+              <a:rPr lang="x-none" altLang="pt-BR">
+                <a:solidFill>
+                  <a:srgbClr val="92D050"/>
+                </a:solidFill>
+              </a:rPr>
+              <a:t>8) O navegador começa a renderização da página HTML</a:t>
+            </a:r>
+            <a:endParaRPr lang="x-none" altLang="pt-BR">
+              <a:solidFill>
+                <a:srgbClr val="92D050"/>
+              </a:solidFill>
+            </a:endParaRPr>
+          </a:p>
+        </p:txBody>
+      </p:sp>
+      <p:pic>
+        <p:nvPicPr>
+          <p:cNvPr id="4" name="imagem 3"/>
+          <p:cNvPicPr>
+            <a:picLocks noChangeAspect="1"/>
+          </p:cNvPicPr>
+          <p:nvPr/>
+        </p:nvPicPr>
+        <p:blipFill>
+          <a:blip r:embed="rId1"/>
+          <a:stretch>
+            <a:fillRect/>
+          </a:stretch>
+        </p:blipFill>
+        <p:spPr>
+          <a:xfrm>
+            <a:off x="898525" y="2781935"/>
+            <a:ext cx="7145655" cy="3593465"/>
+          </a:xfrm>
+          <a:prstGeom prst="rect">
+            <a:avLst/>
+          </a:prstGeom>
+        </p:spPr>
+      </p:pic>
+    </p:spTree>
+  </p:cSld>
+  <p:clrMapOvr>
+    <a:masterClrMapping/>
+  </p:clrMapOvr>
+</p:sld>
+</file>
+
+<file path=ppt/slides/slide17.xml><?xml version="1.0" encoding="utf-8"?>
+<p:sld xmlns:a="http://schemas.openxmlformats.org/drawingml/2006/main" xmlns:r="http://schemas.openxmlformats.org/officeDocument/2006/relationships" xmlns:p="http://schemas.openxmlformats.org/presentationml/2006/main">
+  <p:cSld>
+    <p:spTree>
+      <p:nvGrpSpPr>
+        <p:cNvPr id="1" name=""/>
+        <p:cNvGrpSpPr/>
+        <p:nvPr/>
+      </p:nvGrpSpPr>
+      <p:grpSpPr/>
+      <p:sp>
+        <p:nvSpPr>
+          <p:cNvPr id="2" name="Title 1"/>
+          <p:cNvSpPr>
+            <a:spLocks noGrp="1"/>
+          </p:cNvSpPr>
+          <p:nvPr>
+            <p:ph type="title"/>
+          </p:nvPr>
+        </p:nvSpPr>
+        <p:spPr/>
+        <p:txBody>
+          <a:bodyPr/>
+          <a:p>
+            <a:r>
+              <a:rPr lang="x-none" altLang="pt-BR"/>
+              <a:t>Como a WWW funciona?</a:t>
+            </a:r>
+            <a:endParaRPr lang="x-none" altLang="pt-BR"/>
+          </a:p>
+        </p:txBody>
+      </p:sp>
+      <p:sp>
+        <p:nvSpPr>
+          <p:cNvPr id="3" name="Content Placeholder 2"/>
+          <p:cNvSpPr>
+            <a:spLocks noGrp="1"/>
+          </p:cNvSpPr>
+          <p:nvPr>
+            <p:ph idx="1"/>
+          </p:nvPr>
+        </p:nvSpPr>
+        <p:spPr/>
+        <p:txBody>
+          <a:bodyPr/>
+          <a:p>
+            <a:r>
+              <a:rPr lang="x-none" altLang="pt-BR">
+                <a:solidFill>
+                  <a:srgbClr val="92D050"/>
+                </a:solidFill>
+              </a:rPr>
+              <a:t>9) O navegador envia requisições para os objetos dentro do HTML</a:t>
+            </a:r>
+            <a:endParaRPr lang="x-none" altLang="pt-BR">
+              <a:solidFill>
+                <a:srgbClr val="92D050"/>
+              </a:solidFill>
+            </a:endParaRPr>
+          </a:p>
+          <a:p>
+            <a:pPr lvl="1"/>
+            <a:r>
+              <a:rPr lang="x-none" altLang="pt-BR"/>
+              <a:t>Imagens</a:t>
+            </a:r>
+            <a:endParaRPr lang="x-none" altLang="pt-BR"/>
+          </a:p>
+          <a:p>
+            <a:pPr lvl="1"/>
+            <a:r>
+              <a:rPr lang="x-none" altLang="pt-BR"/>
+              <a:t>Folhas de estilo (CSS)</a:t>
+            </a:r>
+            <a:endParaRPr lang="x-none" altLang="pt-BR"/>
+          </a:p>
+          <a:p>
+            <a:pPr lvl="1"/>
+            <a:r>
+              <a:rPr lang="x-none" altLang="pt-BR"/>
+              <a:t>Arquivos JavaScript</a:t>
+            </a:r>
+            <a:endParaRPr lang="x-none" altLang="pt-BR"/>
+          </a:p>
+        </p:txBody>
+      </p:sp>
+      <p:pic>
+        <p:nvPicPr>
+          <p:cNvPr id="4" name="imagem 3"/>
+          <p:cNvPicPr>
+            <a:picLocks noChangeAspect="1"/>
+          </p:cNvPicPr>
+          <p:nvPr/>
+        </p:nvPicPr>
+        <p:blipFill>
+          <a:blip r:embed="rId1"/>
+          <a:stretch>
+            <a:fillRect/>
+          </a:stretch>
+        </p:blipFill>
+        <p:spPr>
+          <a:xfrm>
+            <a:off x="5819140" y="4648835"/>
+            <a:ext cx="2663825" cy="1551940"/>
+          </a:xfrm>
+          <a:prstGeom prst="rect">
+            <a:avLst/>
+          </a:prstGeom>
+        </p:spPr>
+      </p:pic>
+    </p:spTree>
+  </p:cSld>
+  <p:clrMapOvr>
+    <a:masterClrMapping/>
+  </p:clrMapOvr>
+</p:sld>
+</file>
+
+<file path=ppt/slides/slide18.xml><?xml version="1.0" encoding="utf-8"?>
+<p:sld xmlns:a="http://schemas.openxmlformats.org/drawingml/2006/main" xmlns:r="http://schemas.openxmlformats.org/officeDocument/2006/relationships" xmlns:p="http://schemas.openxmlformats.org/presentationml/2006/main">
+  <p:cSld>
+    <p:spTree>
+      <p:nvGrpSpPr>
+        <p:cNvPr id="1" name=""/>
+        <p:cNvGrpSpPr/>
+        <p:nvPr/>
+      </p:nvGrpSpPr>
+      <p:grpSpPr/>
+      <p:sp>
+        <p:nvSpPr>
+          <p:cNvPr id="2" name="Title 1"/>
+          <p:cNvSpPr>
+            <a:spLocks noGrp="1"/>
+          </p:cNvSpPr>
+          <p:nvPr>
+            <p:ph type="title"/>
+          </p:nvPr>
+        </p:nvSpPr>
+        <p:spPr/>
+        <p:txBody>
+          <a:bodyPr/>
+          <a:p>
+            <a:r>
+              <a:rPr lang="x-none" altLang="pt-BR"/>
+              <a:t>Como a WWW funciona?</a:t>
+            </a:r>
+            <a:endParaRPr lang="x-none" altLang="pt-BR"/>
+          </a:p>
+        </p:txBody>
+      </p:sp>
+      <p:sp>
+        <p:nvSpPr>
+          <p:cNvPr id="3" name="Content Placeholder 2"/>
+          <p:cNvSpPr>
+            <a:spLocks noGrp="1"/>
+          </p:cNvSpPr>
+          <p:nvPr>
+            <p:ph idx="1"/>
+          </p:nvPr>
+        </p:nvSpPr>
+        <p:spPr/>
+        <p:txBody>
+          <a:bodyPr/>
+          <a:p>
+            <a:r>
+              <a:rPr lang="x-none" altLang="pt-BR">
+                <a:solidFill>
+                  <a:srgbClr val="92D050"/>
+                </a:solidFill>
+              </a:rPr>
+              <a:t>10) O navegador pode enviar mais requisições assíncronas (AJAX), mesmo após a página ter sido processada</a:t>
+            </a:r>
+            <a:endParaRPr lang="x-none" altLang="pt-BR">
+              <a:solidFill>
+                <a:srgbClr val="92D050"/>
+              </a:solidFill>
+            </a:endParaRPr>
+          </a:p>
+          <a:p>
+            <a:pPr lvl="1"/>
+            <a:r>
+              <a:rPr lang="x-none" altLang="pt-BR">
+                <a:solidFill>
+                  <a:srgbClr val="00B0F0"/>
+                </a:solidFill>
+              </a:rPr>
+              <a:t>AJAX</a:t>
+            </a:r>
+            <a:r>
+              <a:rPr lang="x-none" altLang="pt-BR"/>
+              <a:t>: Assynchronous Javascript and XML</a:t>
+            </a:r>
+            <a:endParaRPr lang="x-none" altLang="pt-BR"/>
+          </a:p>
+          <a:p>
+            <a:pPr lvl="1"/>
+            <a:r>
+              <a:rPr lang="x-none" altLang="pt-BR"/>
+              <a:t>Serve para atualizar elementos da página sem precisar recarregar a página inteira</a:t>
+            </a:r>
+            <a:endParaRPr lang="x-none" altLang="pt-BR"/>
+          </a:p>
+          <a:p>
+            <a:pPr lvl="1"/>
+            <a:r>
+              <a:rPr lang="x-none" altLang="pt-BR" sz="2400"/>
+              <a:t>Exemplos de uso de AJAX:</a:t>
+            </a:r>
+            <a:endParaRPr lang="x-none" altLang="pt-BR" sz="2400"/>
+          </a:p>
+          <a:p>
+            <a:pPr lvl="2"/>
+            <a:r>
+              <a:rPr lang="x-none" altLang="pt-BR" sz="2215"/>
+              <a:t>Chat</a:t>
+            </a:r>
+            <a:endParaRPr lang="x-none" altLang="pt-BR" sz="2215"/>
+          </a:p>
+          <a:p>
+            <a:pPr lvl="2"/>
+            <a:r>
+              <a:rPr lang="x-none" altLang="pt-BR" sz="2215"/>
+              <a:t>Notificações</a:t>
+            </a:r>
+            <a:endParaRPr lang="x-none" altLang="pt-BR" sz="2215"/>
+          </a:p>
+          <a:p>
+            <a:pPr lvl="1"/>
+            <a:endParaRPr lang="x-none" altLang="pt-BR"/>
+          </a:p>
+        </p:txBody>
+      </p:sp>
+    </p:spTree>
+  </p:cSld>
+  <p:clrMapOvr>
+    <a:masterClrMapping/>
+  </p:clrMapOvr>
+</p:sld>
+</file>
+
+<file path=ppt/slides/slide19.xml><?xml version="1.0" encoding="utf-8"?>
+<p:sld xmlns:a="http://schemas.openxmlformats.org/drawingml/2006/main" xmlns:r="http://schemas.openxmlformats.org/officeDocument/2006/relationships" xmlns:p="http://schemas.openxmlformats.org/presentationml/2006/main">
+  <p:cSld>
+    <p:spTree>
+      <p:nvGrpSpPr>
+        <p:cNvPr id="1" name=""/>
+        <p:cNvGrpSpPr/>
+        <p:nvPr/>
+      </p:nvGrpSpPr>
+      <p:grpSpPr/>
+      <p:sp>
+        <p:nvSpPr>
+          <p:cNvPr id="2" name="Title 1"/>
+          <p:cNvSpPr>
+            <a:spLocks noGrp="1"/>
+          </p:cNvSpPr>
+          <p:nvPr>
+            <p:ph type="title"/>
+          </p:nvPr>
+        </p:nvSpPr>
+        <p:spPr/>
+        <p:txBody>
+          <a:bodyPr/>
+          <a:p>
+            <a:r>
+              <a:rPr lang="x-none" altLang="pt-BR"/>
+              <a:t>Conclusão</a:t>
+            </a:r>
+            <a:endParaRPr lang="x-none" altLang="pt-BR"/>
+          </a:p>
+        </p:txBody>
+      </p:sp>
+      <p:sp>
+        <p:nvSpPr>
+          <p:cNvPr id="3" name="Content Placeholder 2"/>
+          <p:cNvSpPr>
+            <a:spLocks noGrp="1"/>
+          </p:cNvSpPr>
+          <p:nvPr>
+            <p:ph idx="1"/>
+          </p:nvPr>
+        </p:nvSpPr>
+        <p:spPr/>
+        <p:txBody>
+          <a:bodyPr>
+            <a:normAutofit fontScale="90000" lnSpcReduction="10000"/>
+          </a:bodyPr>
+          <a:p>
+            <a:r>
+              <a:rPr lang="x-none" altLang="pt-BR">
+                <a:solidFill>
+                  <a:srgbClr val="00B0F0"/>
+                </a:solidFill>
+              </a:rPr>
+              <a:t>Não confunda!</a:t>
+            </a:r>
+            <a:endParaRPr lang="x-none" altLang="pt-BR">
+              <a:solidFill>
+                <a:srgbClr val="00B0F0"/>
+              </a:solidFill>
+            </a:endParaRPr>
+          </a:p>
+          <a:p>
+            <a:pPr lvl="1"/>
+            <a:r>
+              <a:rPr lang="x-none" altLang="pt-BR">
+                <a:solidFill>
+                  <a:srgbClr val="92D050"/>
+                </a:solidFill>
+              </a:rPr>
+              <a:t>Website </a:t>
+            </a:r>
+            <a:r>
+              <a:rPr lang="x-none" altLang="pt-BR"/>
+              <a:t>contém apenas arquivos estáticos</a:t>
+            </a:r>
+            <a:endParaRPr lang="x-none" altLang="pt-BR"/>
+          </a:p>
+          <a:p>
+            <a:pPr lvl="2"/>
+            <a:r>
+              <a:rPr lang="x-none" altLang="pt-BR"/>
+              <a:t>HTML, CSS, JavaScript, imagens, etc</a:t>
+            </a:r>
+            <a:endParaRPr lang="x-none" altLang="pt-BR"/>
+          </a:p>
+          <a:p>
+            <a:pPr lvl="1"/>
+            <a:r>
+              <a:rPr lang="x-none" altLang="pt-BR">
+                <a:solidFill>
+                  <a:srgbClr val="92D050"/>
+                </a:solidFill>
+              </a:rPr>
+              <a:t>Programa ou aplicativo web</a:t>
+            </a:r>
+            <a:r>
+              <a:rPr lang="x-none" altLang="pt-BR"/>
+              <a:t> precisa ser desenvolvido no lado do servidor utilizando uma linguagem de programação</a:t>
+            </a:r>
+            <a:endParaRPr lang="x-none" altLang="pt-BR"/>
+          </a:p>
+          <a:p>
+            <a:pPr lvl="2"/>
+            <a:r>
+              <a:rPr lang="x-none" altLang="pt-BR"/>
+              <a:t>ASP.NET utiliza C#</a:t>
+            </a:r>
+            <a:endParaRPr lang="x-none" altLang="pt-BR"/>
+          </a:p>
+          <a:p>
+            <a:pPr lvl="0"/>
+            <a:r>
+              <a:rPr lang="x-none" altLang="pt-BR">
+                <a:solidFill>
+                  <a:srgbClr val="00B0F0"/>
+                </a:solidFill>
+              </a:rPr>
+              <a:t>Vantagens em programar para web:</a:t>
+            </a:r>
+            <a:endParaRPr lang="x-none" altLang="pt-BR">
+              <a:solidFill>
+                <a:srgbClr val="00B0F0"/>
+              </a:solidFill>
+            </a:endParaRPr>
+          </a:p>
+          <a:p>
+            <a:pPr lvl="1"/>
+            <a:r>
+              <a:rPr lang="x-none" altLang="pt-BR">
+                <a:sym typeface="+mn-ea"/>
+              </a:rPr>
+              <a:t>Usuário precisa apenas de um navegador</a:t>
+            </a:r>
+            <a:endParaRPr lang="x-none" altLang="pt-BR"/>
+          </a:p>
+          <a:p>
+            <a:pPr lvl="1"/>
+            <a:r>
+              <a:rPr lang="x-none" altLang="pt-BR"/>
+              <a:t>Sem necessidade de download do programa</a:t>
+            </a:r>
+            <a:endParaRPr lang="x-none" altLang="pt-BR"/>
+          </a:p>
+          <a:p>
+            <a:pPr lvl="1"/>
+            <a:r>
+              <a:rPr lang="x-none" altLang="pt-BR"/>
+              <a:t>Atualizações do programa são transparentes</a:t>
+            </a:r>
+            <a:endParaRPr lang="x-none" altLang="pt-BR"/>
+          </a:p>
+          <a:p>
+            <a:pPr lvl="1"/>
+            <a:endParaRPr lang="x-none" altLang="pt-BR"/>
+          </a:p>
+        </p:txBody>
+      </p:sp>
+    </p:spTree>
+  </p:cSld>
+  <p:clrMapOvr>
+    <a:masterClrMapping/>
+  </p:clrMapOvr>
+</p:sld>
+</file>
+
 <file path=ppt/slides/slide2.xml><?xml version="1.0" encoding="utf-8"?>
 <p:sld xmlns:a="http://schemas.openxmlformats.org/drawingml/2006/main" xmlns:r="http://schemas.openxmlformats.org/officeDocument/2006/relationships" xmlns:p="http://schemas.openxmlformats.org/presentationml/2006/main">
   <p:cSld>
@@ -3817,6 +5486,13 @@
             <a:r>
               <a:rPr lang="x-none"/>
               <a:t>Como a WWW funciona?</a:t>
+            </a:r>
+            <a:endParaRPr lang="x-none"/>
+          </a:p>
+          <a:p>
+            <a:r>
+              <a:rPr lang="x-none"/>
+              <a:t>Conclusão</a:t>
             </a:r>
             <a:endParaRPr lang="x-none"/>
           </a:p>
@@ -4690,10 +6366,180 @@
         <p:txBody>
           <a:bodyPr/>
           <a:p>
-            <a:endParaRPr lang="pt-BR" altLang="en-US"/>
-          </a:p>
-        </p:txBody>
-      </p:sp>
+            <a:r>
+              <a:rPr lang="x-none" altLang="pt-BR">
+                <a:solidFill>
+                  <a:srgbClr val="92D050"/>
+                </a:solidFill>
+              </a:rPr>
+              <a:t>1) Você digita um URL no navegador</a:t>
+            </a:r>
+            <a:endParaRPr lang="x-none" altLang="pt-BR">
+              <a:solidFill>
+                <a:srgbClr val="92D050"/>
+              </a:solidFill>
+            </a:endParaRPr>
+          </a:p>
+        </p:txBody>
+      </p:sp>
+      <p:pic>
+        <p:nvPicPr>
+          <p:cNvPr id="6" name="imagem 5"/>
+          <p:cNvPicPr>
+            <a:picLocks noChangeAspect="1"/>
+          </p:cNvPicPr>
+          <p:nvPr/>
+        </p:nvPicPr>
+        <p:blipFill>
+          <a:blip r:embed="rId1"/>
+          <a:stretch>
+            <a:fillRect/>
+          </a:stretch>
+        </p:blipFill>
+        <p:spPr>
+          <a:xfrm>
+            <a:off x="611505" y="2924810"/>
+            <a:ext cx="7639685" cy="2169795"/>
+          </a:xfrm>
+          <a:prstGeom prst="rect">
+            <a:avLst/>
+          </a:prstGeom>
+        </p:spPr>
+      </p:pic>
+    </p:spTree>
+  </p:cSld>
+  <p:clrMapOvr>
+    <a:masterClrMapping/>
+  </p:clrMapOvr>
+</p:sld>
+</file>
+
+<file path=ppt/slides/slide9.xml><?xml version="1.0" encoding="utf-8"?>
+<p:sld xmlns:a="http://schemas.openxmlformats.org/drawingml/2006/main" xmlns:r="http://schemas.openxmlformats.org/officeDocument/2006/relationships" xmlns:p="http://schemas.openxmlformats.org/presentationml/2006/main">
+  <p:cSld>
+    <p:spTree>
+      <p:nvGrpSpPr>
+        <p:cNvPr id="1" name=""/>
+        <p:cNvGrpSpPr/>
+        <p:nvPr/>
+      </p:nvGrpSpPr>
+      <p:grpSpPr/>
+      <p:sp>
+        <p:nvSpPr>
+          <p:cNvPr id="2" name="Title 1"/>
+          <p:cNvSpPr>
+            <a:spLocks noGrp="1"/>
+          </p:cNvSpPr>
+          <p:nvPr>
+            <p:ph type="title"/>
+          </p:nvPr>
+        </p:nvSpPr>
+        <p:spPr/>
+        <p:txBody>
+          <a:bodyPr/>
+          <a:p>
+            <a:r>
+              <a:rPr lang="x-none" altLang="pt-BR"/>
+              <a:t>Como a WWW funciona?</a:t>
+            </a:r>
+            <a:endParaRPr lang="x-none" altLang="pt-BR"/>
+          </a:p>
+        </p:txBody>
+      </p:sp>
+      <p:sp>
+        <p:nvSpPr>
+          <p:cNvPr id="3" name="Content Placeholder 2"/>
+          <p:cNvSpPr>
+            <a:spLocks noGrp="1"/>
+          </p:cNvSpPr>
+          <p:nvPr>
+            <p:ph idx="1"/>
+          </p:nvPr>
+        </p:nvSpPr>
+        <p:spPr/>
+        <p:txBody>
+          <a:bodyPr/>
+          <a:p>
+            <a:r>
+              <a:rPr lang="x-none" altLang="pt-BR">
+                <a:solidFill>
+                  <a:srgbClr val="92D050"/>
+                </a:solidFill>
+              </a:rPr>
+              <a:t>2) O navegador procura o endereço IP para o nome do domínio</a:t>
+            </a:r>
+            <a:endParaRPr lang="x-none" altLang="pt-BR">
+              <a:solidFill>
+                <a:srgbClr val="92D050"/>
+              </a:solidFill>
+            </a:endParaRPr>
+          </a:p>
+          <a:p>
+            <a:pPr lvl="1"/>
+            <a:r>
+              <a:rPr lang="x-none" altLang="pt-BR"/>
+              <a:t>Cache do navegador</a:t>
+            </a:r>
+            <a:endParaRPr lang="x-none" altLang="pt-BR"/>
+          </a:p>
+          <a:p>
+            <a:pPr lvl="1"/>
+            <a:r>
+              <a:rPr lang="x-none" altLang="pt-BR"/>
+              <a:t>Cache do sistema operacional</a:t>
+            </a:r>
+            <a:endParaRPr lang="x-none" altLang="pt-BR"/>
+          </a:p>
+          <a:p>
+            <a:pPr lvl="1"/>
+            <a:r>
+              <a:rPr lang="x-none" altLang="pt-BR"/>
+              <a:t>Cache do roteador</a:t>
+            </a:r>
+            <a:endParaRPr lang="x-none" altLang="pt-BR"/>
+          </a:p>
+          <a:p>
+            <a:pPr lvl="1"/>
+            <a:r>
+              <a:rPr lang="x-none" altLang="pt-BR"/>
+              <a:t>Cache do provedor</a:t>
+            </a:r>
+            <a:endParaRPr lang="x-none" altLang="pt-BR"/>
+          </a:p>
+          <a:p>
+            <a:pPr lvl="1"/>
+            <a:r>
+              <a:rPr lang="x-none" altLang="pt-BR"/>
+              <a:t>Busca recursiva</a:t>
+            </a:r>
+            <a:endParaRPr lang="x-none" altLang="pt-BR"/>
+          </a:p>
+        </p:txBody>
+      </p:sp>
+      <p:pic>
+        <p:nvPicPr>
+          <p:cNvPr id="4" name="imagem 3"/>
+          <p:cNvPicPr>
+            <a:picLocks noChangeAspect="1"/>
+          </p:cNvPicPr>
+          <p:nvPr/>
+        </p:nvPicPr>
+        <p:blipFill>
+          <a:blip r:embed="rId1"/>
+          <a:stretch>
+            <a:fillRect/>
+          </a:stretch>
+        </p:blipFill>
+        <p:spPr>
+          <a:xfrm>
+            <a:off x="5148580" y="4793615"/>
+            <a:ext cx="3225800" cy="1344295"/>
+          </a:xfrm>
+          <a:prstGeom prst="rect">
+            <a:avLst/>
+          </a:prstGeom>
+        </p:spPr>
+      </p:pic>
     </p:spTree>
   </p:cSld>
   <p:clrMapOvr>

</xml_diff>